<commit_message>
Add final poster with grammar correction
</commit_message>
<xml_diff>
--- a/Final Presentation.pptx
+++ b/Final Presentation.pptx
@@ -3690,9 +3690,9 @@
         <p:grpSpPr>
           <a:xfrm>
             <a:off x="613750" y="3961533"/>
-            <a:ext cx="9601741" cy="6238689"/>
+            <a:ext cx="9601741" cy="6748417"/>
             <a:chOff x="576544" y="12808367"/>
-            <a:chExt cx="12228079" cy="11163647"/>
+            <a:chExt cx="12228079" cy="12075766"/>
           </a:xfrm>
         </p:grpSpPr>
         <p:sp>
@@ -3704,7 +3704,7 @@
           <p:spPr>
             <a:xfrm>
               <a:off x="582533" y="14144661"/>
-              <a:ext cx="12222090" cy="9827353"/>
+              <a:ext cx="12222090" cy="10739472"/>
             </a:xfrm>
             <a:prstGeom prst="rect">
               <a:avLst/>
@@ -3729,7 +3729,7 @@
                   <a:latin typeface="Arial" panose="020B0604020202020204" pitchFamily="34" charset="0"/>
                   <a:cs typeface="Arial" panose="020B0604020202020204" pitchFamily="34" charset="0"/>
                 </a:rPr>
-                <a:t>With the recent pandemic and the rising inflation this year it is clearly that who are found to be in lower income bracket are drastically affected. With the large income disparity in The United States, it becomes a concern as to what it would look like in the future if things are not improved or changed. By taking income data, housing data, and the cost-of-living data we want to analyze the trends that are occurring for the cost of living based on the counties in The United States. </a:t>
+                <a:t>With the recent pandemic and the rise in inflation, in 2022, it is clearly those who are in a lower income bracket are drastically affected. With the large income disparity in The United States, it becomes a concern as to what it would look like in the future if things are not improved or changed. By taking income data, housing data, and the cost-of-living data we want to analyze the trends that are occurring for the cost of living based on the counties in The United States. </a:t>
               </a:r>
             </a:p>
             <a:p>
@@ -6206,9 +6206,9 @@
         <p:grpSpPr>
           <a:xfrm>
             <a:off x="655688" y="9976620"/>
-            <a:ext cx="9642077" cy="10816600"/>
+            <a:ext cx="9642077" cy="10324157"/>
             <a:chOff x="262025" y="-4982595"/>
-            <a:chExt cx="12274123" cy="17711564"/>
+            <a:chExt cx="12274123" cy="16905216"/>
           </a:xfrm>
         </p:grpSpPr>
         <p:sp>
@@ -6226,7 +6226,7 @@
           <p:spPr>
             <a:xfrm>
               <a:off x="314059" y="-3549150"/>
-              <a:ext cx="12222089" cy="16278119"/>
+              <a:ext cx="12222089" cy="15471771"/>
             </a:xfrm>
             <a:prstGeom prst="rect">
               <a:avLst/>
@@ -6438,18 +6438,15 @@
                   <a:latin typeface="Arial" panose="020B0604020202020204" pitchFamily="34" charset="0"/>
                   <a:cs typeface="Arial" panose="020B0604020202020204" pitchFamily="34" charset="0"/>
                 </a:rPr>
-                <a:t>based off of County and Income. </a:t>
+                <a:t>based off of County and Income</a:t>
               </a:r>
-            </a:p>
-            <a:p>
-              <a:pPr lvl="1" indent="0" algn="just">
-                <a:spcBef>
-                  <a:spcPts val="0"/>
-                </a:spcBef>
-                <a:spcAft>
-                  <a:spcPts val="0"/>
-                </a:spcAft>
-              </a:pPr>
+              <a:r>
+                <a:rPr lang="en-US" sz="3200">
+                  <a:latin typeface="Arial" panose="020B0604020202020204" pitchFamily="34" charset="0"/>
+                  <a:cs typeface="Arial" panose="020B0604020202020204" pitchFamily="34" charset="0"/>
+                </a:rPr>
+                <a:t>. </a:t>
+              </a:r>
               <a:endParaRPr lang="en-US" sz="3200" dirty="0">
                 <a:latin typeface="Arial" panose="020B0604020202020204" pitchFamily="34" charset="0"/>
                 <a:cs typeface="Arial" panose="020B0604020202020204" pitchFamily="34" charset="0"/>

</xml_diff>